<commit_message>
Reducing size of pdf to less than 10 MB
</commit_message>
<xml_diff>
--- a/RA-L/pictures/pdf/twoR1.pptx
+++ b/RA-L/pictures/pdf/twoR1.pptx
@@ -7,14 +7,14 @@
   <p:sldIdLst>
     <p:sldId id="256" r:id="rId2"/>
   </p:sldIdLst>
-  <p:sldSz cx="6858000" cy="6858000"/>
+  <p:sldSz cx="3200400" cy="3200400"/>
   <p:notesSz cx="6858000" cy="9144000"/>
   <p:defaultTextStyle>
     <a:defPPr>
       <a:defRPr lang="en-US"/>
     </a:defPPr>
-    <a:lvl1pPr marL="0" algn="l" defTabSz="457200" rtl="0" eaLnBrk="1" latinLnBrk="0" hangingPunct="1">
-      <a:defRPr sz="1800" kern="1200">
+    <a:lvl1pPr marL="0" algn="l" defTabSz="213330" rtl="0" eaLnBrk="1" latinLnBrk="0" hangingPunct="1">
+      <a:defRPr sz="800" kern="1200">
         <a:solidFill>
           <a:schemeClr val="tx1"/>
         </a:solidFill>
@@ -23,8 +23,8 @@
         <a:cs typeface="+mn-cs"/>
       </a:defRPr>
     </a:lvl1pPr>
-    <a:lvl2pPr marL="457200" algn="l" defTabSz="457200" rtl="0" eaLnBrk="1" latinLnBrk="0" hangingPunct="1">
-      <a:defRPr sz="1800" kern="1200">
+    <a:lvl2pPr marL="213330" algn="l" defTabSz="213330" rtl="0" eaLnBrk="1" latinLnBrk="0" hangingPunct="1">
+      <a:defRPr sz="800" kern="1200">
         <a:solidFill>
           <a:schemeClr val="tx1"/>
         </a:solidFill>
@@ -33,8 +33,8 @@
         <a:cs typeface="+mn-cs"/>
       </a:defRPr>
     </a:lvl2pPr>
-    <a:lvl3pPr marL="914400" algn="l" defTabSz="457200" rtl="0" eaLnBrk="1" latinLnBrk="0" hangingPunct="1">
-      <a:defRPr sz="1800" kern="1200">
+    <a:lvl3pPr marL="426659" algn="l" defTabSz="213330" rtl="0" eaLnBrk="1" latinLnBrk="0" hangingPunct="1">
+      <a:defRPr sz="800" kern="1200">
         <a:solidFill>
           <a:schemeClr val="tx1"/>
         </a:solidFill>
@@ -43,8 +43,8 @@
         <a:cs typeface="+mn-cs"/>
       </a:defRPr>
     </a:lvl3pPr>
-    <a:lvl4pPr marL="1371600" algn="l" defTabSz="457200" rtl="0" eaLnBrk="1" latinLnBrk="0" hangingPunct="1">
-      <a:defRPr sz="1800" kern="1200">
+    <a:lvl4pPr marL="639989" algn="l" defTabSz="213330" rtl="0" eaLnBrk="1" latinLnBrk="0" hangingPunct="1">
+      <a:defRPr sz="800" kern="1200">
         <a:solidFill>
           <a:schemeClr val="tx1"/>
         </a:solidFill>
@@ -53,8 +53,8 @@
         <a:cs typeface="+mn-cs"/>
       </a:defRPr>
     </a:lvl4pPr>
-    <a:lvl5pPr marL="1828800" algn="l" defTabSz="457200" rtl="0" eaLnBrk="1" latinLnBrk="0" hangingPunct="1">
-      <a:defRPr sz="1800" kern="1200">
+    <a:lvl5pPr marL="853318" algn="l" defTabSz="213330" rtl="0" eaLnBrk="1" latinLnBrk="0" hangingPunct="1">
+      <a:defRPr sz="800" kern="1200">
         <a:solidFill>
           <a:schemeClr val="tx1"/>
         </a:solidFill>
@@ -63,8 +63,8 @@
         <a:cs typeface="+mn-cs"/>
       </a:defRPr>
     </a:lvl5pPr>
-    <a:lvl6pPr marL="2286000" algn="l" defTabSz="457200" rtl="0" eaLnBrk="1" latinLnBrk="0" hangingPunct="1">
-      <a:defRPr sz="1800" kern="1200">
+    <a:lvl6pPr marL="1066648" algn="l" defTabSz="213330" rtl="0" eaLnBrk="1" latinLnBrk="0" hangingPunct="1">
+      <a:defRPr sz="800" kern="1200">
         <a:solidFill>
           <a:schemeClr val="tx1"/>
         </a:solidFill>
@@ -73,8 +73,8 @@
         <a:cs typeface="+mn-cs"/>
       </a:defRPr>
     </a:lvl6pPr>
-    <a:lvl7pPr marL="2743200" algn="l" defTabSz="457200" rtl="0" eaLnBrk="1" latinLnBrk="0" hangingPunct="1">
-      <a:defRPr sz="1800" kern="1200">
+    <a:lvl7pPr marL="1279977" algn="l" defTabSz="213330" rtl="0" eaLnBrk="1" latinLnBrk="0" hangingPunct="1">
+      <a:defRPr sz="800" kern="1200">
         <a:solidFill>
           <a:schemeClr val="tx1"/>
         </a:solidFill>
@@ -83,8 +83,8 @@
         <a:cs typeface="+mn-cs"/>
       </a:defRPr>
     </a:lvl7pPr>
-    <a:lvl8pPr marL="3200400" algn="l" defTabSz="457200" rtl="0" eaLnBrk="1" latinLnBrk="0" hangingPunct="1">
-      <a:defRPr sz="1800" kern="1200">
+    <a:lvl8pPr marL="1493307" algn="l" defTabSz="213330" rtl="0" eaLnBrk="1" latinLnBrk="0" hangingPunct="1">
+      <a:defRPr sz="800" kern="1200">
         <a:solidFill>
           <a:schemeClr val="tx1"/>
         </a:solidFill>
@@ -93,8 +93,8 @@
         <a:cs typeface="+mn-cs"/>
       </a:defRPr>
     </a:lvl8pPr>
-    <a:lvl9pPr marL="3657600" algn="l" defTabSz="457200" rtl="0" eaLnBrk="1" latinLnBrk="0" hangingPunct="1">
-      <a:defRPr sz="1800" kern="1200">
+    <a:lvl9pPr marL="1706636" algn="l" defTabSz="213330" rtl="0" eaLnBrk="1" latinLnBrk="0" hangingPunct="1">
+      <a:defRPr sz="800" kern="1200">
         <a:solidFill>
           <a:schemeClr val="tx1"/>
         </a:solidFill>
@@ -136,8 +136,8 @@
         </p:nvSpPr>
         <p:spPr>
           <a:xfrm>
-            <a:off x="514350" y="2130426"/>
-            <a:ext cx="5829300" cy="1470025"/>
+            <a:off x="240030" y="994199"/>
+            <a:ext cx="2720340" cy="686012"/>
           </a:xfrm>
         </p:spPr>
         <p:txBody>
@@ -164,8 +164,8 @@
         </p:nvSpPr>
         <p:spPr>
           <a:xfrm>
-            <a:off x="1028700" y="3886200"/>
-            <a:ext cx="4800600" cy="1752600"/>
+            <a:off x="480060" y="1813560"/>
+            <a:ext cx="2240280" cy="817880"/>
           </a:xfrm>
         </p:spPr>
         <p:txBody>
@@ -181,7 +181,7 @@
                 </a:solidFill>
               </a:defRPr>
             </a:lvl1pPr>
-            <a:lvl2pPr marL="457200" indent="0" algn="ctr">
+            <a:lvl2pPr marL="213330" indent="0" algn="ctr">
               <a:buNone/>
               <a:defRPr>
                 <a:solidFill>
@@ -191,7 +191,7 @@
                 </a:solidFill>
               </a:defRPr>
             </a:lvl2pPr>
-            <a:lvl3pPr marL="914400" indent="0" algn="ctr">
+            <a:lvl3pPr marL="426659" indent="0" algn="ctr">
               <a:buNone/>
               <a:defRPr>
                 <a:solidFill>
@@ -201,7 +201,7 @@
                 </a:solidFill>
               </a:defRPr>
             </a:lvl3pPr>
-            <a:lvl4pPr marL="1371600" indent="0" algn="ctr">
+            <a:lvl4pPr marL="639989" indent="0" algn="ctr">
               <a:buNone/>
               <a:defRPr>
                 <a:solidFill>
@@ -211,7 +211,7 @@
                 </a:solidFill>
               </a:defRPr>
             </a:lvl4pPr>
-            <a:lvl5pPr marL="1828800" indent="0" algn="ctr">
+            <a:lvl5pPr marL="853318" indent="0" algn="ctr">
               <a:buNone/>
               <a:defRPr>
                 <a:solidFill>
@@ -221,7 +221,7 @@
                 </a:solidFill>
               </a:defRPr>
             </a:lvl5pPr>
-            <a:lvl6pPr marL="2286000" indent="0" algn="ctr">
+            <a:lvl6pPr marL="1066648" indent="0" algn="ctr">
               <a:buNone/>
               <a:defRPr>
                 <a:solidFill>
@@ -231,7 +231,7 @@
                 </a:solidFill>
               </a:defRPr>
             </a:lvl6pPr>
-            <a:lvl7pPr marL="2743200" indent="0" algn="ctr">
+            <a:lvl7pPr marL="1279977" indent="0" algn="ctr">
               <a:buNone/>
               <a:defRPr>
                 <a:solidFill>
@@ -241,7 +241,7 @@
                 </a:solidFill>
               </a:defRPr>
             </a:lvl7pPr>
-            <a:lvl8pPr marL="3200400" indent="0" algn="ctr">
+            <a:lvl8pPr marL="1493307" indent="0" algn="ctr">
               <a:buNone/>
               <a:defRPr>
                 <a:solidFill>
@@ -251,7 +251,7 @@
                 </a:solidFill>
               </a:defRPr>
             </a:lvl8pPr>
-            <a:lvl9pPr marL="3657600" indent="0" algn="ctr">
+            <a:lvl9pPr marL="1706636" indent="0" algn="ctr">
               <a:buNone/>
               <a:defRPr>
                 <a:solidFill>
@@ -548,8 +548,8 @@
         </p:nvSpPr>
         <p:spPr>
           <a:xfrm>
-            <a:off x="3729037" y="274639"/>
-            <a:ext cx="1157288" cy="5851525"/>
+            <a:off x="1740217" y="128165"/>
+            <a:ext cx="540068" cy="2730712"/>
           </a:xfrm>
         </p:spPr>
         <p:txBody>
@@ -576,8 +576,8 @@
         </p:nvSpPr>
         <p:spPr>
           <a:xfrm>
-            <a:off x="257175" y="274639"/>
-            <a:ext cx="3357563" cy="5851525"/>
+            <a:off x="120015" y="128165"/>
+            <a:ext cx="1566863" cy="2730712"/>
           </a:xfrm>
         </p:spPr>
         <p:txBody>
@@ -898,15 +898,15 @@
         </p:nvSpPr>
         <p:spPr>
           <a:xfrm>
-            <a:off x="541735" y="4406901"/>
-            <a:ext cx="5829300" cy="1362075"/>
+            <a:off x="252810" y="2056554"/>
+            <a:ext cx="2720340" cy="635635"/>
           </a:xfrm>
         </p:spPr>
         <p:txBody>
           <a:bodyPr anchor="t"/>
           <a:lstStyle>
             <a:lvl1pPr algn="l">
-              <a:defRPr sz="4000" b="1" cap="all"/>
+              <a:defRPr sz="1900" b="1" cap="all"/>
             </a:lvl1pPr>
           </a:lstStyle>
           <a:p>
@@ -930,8 +930,8 @@
         </p:nvSpPr>
         <p:spPr>
           <a:xfrm>
-            <a:off x="541735" y="2906713"/>
-            <a:ext cx="5829300" cy="1500187"/>
+            <a:off x="252810" y="1356466"/>
+            <a:ext cx="2720340" cy="700087"/>
           </a:xfrm>
         </p:spPr>
         <p:txBody>
@@ -939,7 +939,7 @@
           <a:lstStyle>
             <a:lvl1pPr marL="0" indent="0">
               <a:buNone/>
-              <a:defRPr sz="2000">
+              <a:defRPr sz="900">
                 <a:solidFill>
                   <a:schemeClr val="tx1">
                     <a:tint val="75000"/>
@@ -947,9 +947,9 @@
                 </a:solidFill>
               </a:defRPr>
             </a:lvl1pPr>
-            <a:lvl2pPr marL="457200" indent="0">
-              <a:buNone/>
-              <a:defRPr sz="1800">
+            <a:lvl2pPr marL="213330" indent="0">
+              <a:buNone/>
+              <a:defRPr sz="800">
                 <a:solidFill>
                   <a:schemeClr val="tx1">
                     <a:tint val="75000"/>
@@ -957,9 +957,9 @@
                 </a:solidFill>
               </a:defRPr>
             </a:lvl2pPr>
-            <a:lvl3pPr marL="914400" indent="0">
-              <a:buNone/>
-              <a:defRPr sz="1600">
+            <a:lvl3pPr marL="426659" indent="0">
+              <a:buNone/>
+              <a:defRPr sz="700">
                 <a:solidFill>
                   <a:schemeClr val="tx1">
                     <a:tint val="75000"/>
@@ -967,9 +967,9 @@
                 </a:solidFill>
               </a:defRPr>
             </a:lvl3pPr>
-            <a:lvl4pPr marL="1371600" indent="0">
-              <a:buNone/>
-              <a:defRPr sz="1400">
+            <a:lvl4pPr marL="639989" indent="0">
+              <a:buNone/>
+              <a:defRPr sz="700">
                 <a:solidFill>
                   <a:schemeClr val="tx1">
                     <a:tint val="75000"/>
@@ -977,9 +977,9 @@
                 </a:solidFill>
               </a:defRPr>
             </a:lvl4pPr>
-            <a:lvl5pPr marL="1828800" indent="0">
-              <a:buNone/>
-              <a:defRPr sz="1400">
+            <a:lvl5pPr marL="853318" indent="0">
+              <a:buNone/>
+              <a:defRPr sz="700">
                 <a:solidFill>
                   <a:schemeClr val="tx1">
                     <a:tint val="75000"/>
@@ -987,9 +987,9 @@
                 </a:solidFill>
               </a:defRPr>
             </a:lvl5pPr>
-            <a:lvl6pPr marL="2286000" indent="0">
-              <a:buNone/>
-              <a:defRPr sz="1400">
+            <a:lvl6pPr marL="1066648" indent="0">
+              <a:buNone/>
+              <a:defRPr sz="700">
                 <a:solidFill>
                   <a:schemeClr val="tx1">
                     <a:tint val="75000"/>
@@ -997,9 +997,9 @@
                 </a:solidFill>
               </a:defRPr>
             </a:lvl6pPr>
-            <a:lvl7pPr marL="2743200" indent="0">
-              <a:buNone/>
-              <a:defRPr sz="1400">
+            <a:lvl7pPr marL="1279977" indent="0">
+              <a:buNone/>
+              <a:defRPr sz="700">
                 <a:solidFill>
                   <a:schemeClr val="tx1">
                     <a:tint val="75000"/>
@@ -1007,9 +1007,9 @@
                 </a:solidFill>
               </a:defRPr>
             </a:lvl7pPr>
-            <a:lvl8pPr marL="3200400" indent="0">
-              <a:buNone/>
-              <a:defRPr sz="1400">
+            <a:lvl8pPr marL="1493307" indent="0">
+              <a:buNone/>
+              <a:defRPr sz="700">
                 <a:solidFill>
                   <a:schemeClr val="tx1">
                     <a:tint val="75000"/>
@@ -1017,9 +1017,9 @@
                 </a:solidFill>
               </a:defRPr>
             </a:lvl8pPr>
-            <a:lvl9pPr marL="3657600" indent="0">
-              <a:buNone/>
-              <a:defRPr sz="1400">
+            <a:lvl9pPr marL="1706636" indent="0">
+              <a:buNone/>
+              <a:defRPr sz="700">
                 <a:solidFill>
                   <a:schemeClr val="tx1">
                     <a:tint val="75000"/>
@@ -1167,39 +1167,39 @@
         </p:nvSpPr>
         <p:spPr>
           <a:xfrm>
-            <a:off x="257175" y="1600201"/>
-            <a:ext cx="2257425" cy="4525963"/>
+            <a:off x="120015" y="746761"/>
+            <a:ext cx="1053465" cy="2112116"/>
           </a:xfrm>
         </p:spPr>
         <p:txBody>
           <a:bodyPr/>
           <a:lstStyle>
             <a:lvl1pPr>
-              <a:defRPr sz="2800"/>
+              <a:defRPr sz="1300"/>
             </a:lvl1pPr>
             <a:lvl2pPr>
-              <a:defRPr sz="2400"/>
+              <a:defRPr sz="1100"/>
             </a:lvl2pPr>
             <a:lvl3pPr>
-              <a:defRPr sz="2000"/>
+              <a:defRPr sz="900"/>
             </a:lvl3pPr>
             <a:lvl4pPr>
-              <a:defRPr sz="1800"/>
+              <a:defRPr sz="800"/>
             </a:lvl4pPr>
             <a:lvl5pPr>
-              <a:defRPr sz="1800"/>
+              <a:defRPr sz="800"/>
             </a:lvl5pPr>
             <a:lvl6pPr>
-              <a:defRPr sz="1800"/>
+              <a:defRPr sz="800"/>
             </a:lvl6pPr>
             <a:lvl7pPr>
-              <a:defRPr sz="1800"/>
+              <a:defRPr sz="800"/>
             </a:lvl7pPr>
             <a:lvl8pPr>
-              <a:defRPr sz="1800"/>
+              <a:defRPr sz="800"/>
             </a:lvl8pPr>
             <a:lvl9pPr>
-              <a:defRPr sz="1800"/>
+              <a:defRPr sz="800"/>
             </a:lvl9pPr>
           </a:lstStyle>
           <a:p>
@@ -1252,39 +1252,39 @@
         </p:nvSpPr>
         <p:spPr>
           <a:xfrm>
-            <a:off x="2628900" y="1600201"/>
-            <a:ext cx="2257425" cy="4525963"/>
+            <a:off x="1226820" y="746761"/>
+            <a:ext cx="1053465" cy="2112116"/>
           </a:xfrm>
         </p:spPr>
         <p:txBody>
           <a:bodyPr/>
           <a:lstStyle>
             <a:lvl1pPr>
-              <a:defRPr sz="2800"/>
+              <a:defRPr sz="1300"/>
             </a:lvl1pPr>
             <a:lvl2pPr>
-              <a:defRPr sz="2400"/>
+              <a:defRPr sz="1100"/>
             </a:lvl2pPr>
             <a:lvl3pPr>
-              <a:defRPr sz="2000"/>
+              <a:defRPr sz="900"/>
             </a:lvl3pPr>
             <a:lvl4pPr>
-              <a:defRPr sz="1800"/>
+              <a:defRPr sz="800"/>
             </a:lvl4pPr>
             <a:lvl5pPr>
-              <a:defRPr sz="1800"/>
+              <a:defRPr sz="800"/>
             </a:lvl5pPr>
             <a:lvl6pPr>
-              <a:defRPr sz="1800"/>
+              <a:defRPr sz="800"/>
             </a:lvl6pPr>
             <a:lvl7pPr>
-              <a:defRPr sz="1800"/>
+              <a:defRPr sz="800"/>
             </a:lvl7pPr>
             <a:lvl8pPr>
-              <a:defRPr sz="1800"/>
+              <a:defRPr sz="800"/>
             </a:lvl8pPr>
             <a:lvl9pPr>
-              <a:defRPr sz="1800"/>
+              <a:defRPr sz="800"/>
             </a:lvl9pPr>
           </a:lstStyle>
           <a:p>
@@ -1432,8 +1432,8 @@
         </p:nvSpPr>
         <p:spPr>
           <a:xfrm>
-            <a:off x="342900" y="274638"/>
-            <a:ext cx="6172200" cy="1143000"/>
+            <a:off x="160020" y="128164"/>
+            <a:ext cx="2880360" cy="533400"/>
           </a:xfrm>
         </p:spPr>
         <p:txBody>
@@ -1464,8 +1464,8 @@
         </p:nvSpPr>
         <p:spPr>
           <a:xfrm>
-            <a:off x="342900" y="1535113"/>
-            <a:ext cx="3030141" cy="639762"/>
+            <a:off x="160020" y="716386"/>
+            <a:ext cx="1414066" cy="298556"/>
           </a:xfrm>
         </p:spPr>
         <p:txBody>
@@ -1473,39 +1473,39 @@
           <a:lstStyle>
             <a:lvl1pPr marL="0" indent="0">
               <a:buNone/>
-              <a:defRPr sz="2400" b="1"/>
+              <a:defRPr sz="1100" b="1"/>
             </a:lvl1pPr>
-            <a:lvl2pPr marL="457200" indent="0">
-              <a:buNone/>
-              <a:defRPr sz="2000" b="1"/>
+            <a:lvl2pPr marL="213330" indent="0">
+              <a:buNone/>
+              <a:defRPr sz="900" b="1"/>
             </a:lvl2pPr>
-            <a:lvl3pPr marL="914400" indent="0">
-              <a:buNone/>
-              <a:defRPr sz="1800" b="1"/>
+            <a:lvl3pPr marL="426659" indent="0">
+              <a:buNone/>
+              <a:defRPr sz="800" b="1"/>
             </a:lvl3pPr>
-            <a:lvl4pPr marL="1371600" indent="0">
-              <a:buNone/>
-              <a:defRPr sz="1600" b="1"/>
+            <a:lvl4pPr marL="639989" indent="0">
+              <a:buNone/>
+              <a:defRPr sz="700" b="1"/>
             </a:lvl4pPr>
-            <a:lvl5pPr marL="1828800" indent="0">
-              <a:buNone/>
-              <a:defRPr sz="1600" b="1"/>
+            <a:lvl5pPr marL="853318" indent="0">
+              <a:buNone/>
+              <a:defRPr sz="700" b="1"/>
             </a:lvl5pPr>
-            <a:lvl6pPr marL="2286000" indent="0">
-              <a:buNone/>
-              <a:defRPr sz="1600" b="1"/>
+            <a:lvl6pPr marL="1066648" indent="0">
+              <a:buNone/>
+              <a:defRPr sz="700" b="1"/>
             </a:lvl6pPr>
-            <a:lvl7pPr marL="2743200" indent="0">
-              <a:buNone/>
-              <a:defRPr sz="1600" b="1"/>
+            <a:lvl7pPr marL="1279977" indent="0">
+              <a:buNone/>
+              <a:defRPr sz="700" b="1"/>
             </a:lvl7pPr>
-            <a:lvl8pPr marL="3200400" indent="0">
-              <a:buNone/>
-              <a:defRPr sz="1600" b="1"/>
+            <a:lvl8pPr marL="1493307" indent="0">
+              <a:buNone/>
+              <a:defRPr sz="700" b="1"/>
             </a:lvl8pPr>
-            <a:lvl9pPr marL="3657600" indent="0">
-              <a:buNone/>
-              <a:defRPr sz="1600" b="1"/>
+            <a:lvl9pPr marL="1706636" indent="0">
+              <a:buNone/>
+              <a:defRPr sz="700" b="1"/>
             </a:lvl9pPr>
           </a:lstStyle>
           <a:p>
@@ -1529,39 +1529,39 @@
         </p:nvSpPr>
         <p:spPr>
           <a:xfrm>
-            <a:off x="342900" y="2174875"/>
-            <a:ext cx="3030141" cy="3951288"/>
+            <a:off x="160020" y="1014942"/>
+            <a:ext cx="1414066" cy="1843934"/>
           </a:xfrm>
         </p:spPr>
         <p:txBody>
           <a:bodyPr/>
           <a:lstStyle>
             <a:lvl1pPr>
-              <a:defRPr sz="2400"/>
+              <a:defRPr sz="1100"/>
             </a:lvl1pPr>
             <a:lvl2pPr>
-              <a:defRPr sz="2000"/>
+              <a:defRPr sz="900"/>
             </a:lvl2pPr>
             <a:lvl3pPr>
-              <a:defRPr sz="1800"/>
+              <a:defRPr sz="800"/>
             </a:lvl3pPr>
             <a:lvl4pPr>
-              <a:defRPr sz="1600"/>
+              <a:defRPr sz="700"/>
             </a:lvl4pPr>
             <a:lvl5pPr>
-              <a:defRPr sz="1600"/>
+              <a:defRPr sz="700"/>
             </a:lvl5pPr>
             <a:lvl6pPr>
-              <a:defRPr sz="1600"/>
+              <a:defRPr sz="700"/>
             </a:lvl6pPr>
             <a:lvl7pPr>
-              <a:defRPr sz="1600"/>
+              <a:defRPr sz="700"/>
             </a:lvl7pPr>
             <a:lvl8pPr>
-              <a:defRPr sz="1600"/>
+              <a:defRPr sz="700"/>
             </a:lvl8pPr>
             <a:lvl9pPr>
-              <a:defRPr sz="1600"/>
+              <a:defRPr sz="700"/>
             </a:lvl9pPr>
           </a:lstStyle>
           <a:p>
@@ -1614,8 +1614,8 @@
         </p:nvSpPr>
         <p:spPr>
           <a:xfrm>
-            <a:off x="3483769" y="1535113"/>
-            <a:ext cx="3031331" cy="639762"/>
+            <a:off x="1625759" y="716386"/>
+            <a:ext cx="1414621" cy="298556"/>
           </a:xfrm>
         </p:spPr>
         <p:txBody>
@@ -1623,39 +1623,39 @@
           <a:lstStyle>
             <a:lvl1pPr marL="0" indent="0">
               <a:buNone/>
-              <a:defRPr sz="2400" b="1"/>
+              <a:defRPr sz="1100" b="1"/>
             </a:lvl1pPr>
-            <a:lvl2pPr marL="457200" indent="0">
-              <a:buNone/>
-              <a:defRPr sz="2000" b="1"/>
+            <a:lvl2pPr marL="213330" indent="0">
+              <a:buNone/>
+              <a:defRPr sz="900" b="1"/>
             </a:lvl2pPr>
-            <a:lvl3pPr marL="914400" indent="0">
-              <a:buNone/>
-              <a:defRPr sz="1800" b="1"/>
+            <a:lvl3pPr marL="426659" indent="0">
+              <a:buNone/>
+              <a:defRPr sz="800" b="1"/>
             </a:lvl3pPr>
-            <a:lvl4pPr marL="1371600" indent="0">
-              <a:buNone/>
-              <a:defRPr sz="1600" b="1"/>
+            <a:lvl4pPr marL="639989" indent="0">
+              <a:buNone/>
+              <a:defRPr sz="700" b="1"/>
             </a:lvl4pPr>
-            <a:lvl5pPr marL="1828800" indent="0">
-              <a:buNone/>
-              <a:defRPr sz="1600" b="1"/>
+            <a:lvl5pPr marL="853318" indent="0">
+              <a:buNone/>
+              <a:defRPr sz="700" b="1"/>
             </a:lvl5pPr>
-            <a:lvl6pPr marL="2286000" indent="0">
-              <a:buNone/>
-              <a:defRPr sz="1600" b="1"/>
+            <a:lvl6pPr marL="1066648" indent="0">
+              <a:buNone/>
+              <a:defRPr sz="700" b="1"/>
             </a:lvl6pPr>
-            <a:lvl7pPr marL="2743200" indent="0">
-              <a:buNone/>
-              <a:defRPr sz="1600" b="1"/>
+            <a:lvl7pPr marL="1279977" indent="0">
+              <a:buNone/>
+              <a:defRPr sz="700" b="1"/>
             </a:lvl7pPr>
-            <a:lvl8pPr marL="3200400" indent="0">
-              <a:buNone/>
-              <a:defRPr sz="1600" b="1"/>
+            <a:lvl8pPr marL="1493307" indent="0">
+              <a:buNone/>
+              <a:defRPr sz="700" b="1"/>
             </a:lvl8pPr>
-            <a:lvl9pPr marL="3657600" indent="0">
-              <a:buNone/>
-              <a:defRPr sz="1600" b="1"/>
+            <a:lvl9pPr marL="1706636" indent="0">
+              <a:buNone/>
+              <a:defRPr sz="700" b="1"/>
             </a:lvl9pPr>
           </a:lstStyle>
           <a:p>
@@ -1679,39 +1679,39 @@
         </p:nvSpPr>
         <p:spPr>
           <a:xfrm>
-            <a:off x="3483769" y="2174875"/>
-            <a:ext cx="3031331" cy="3951288"/>
+            <a:off x="1625759" y="1014942"/>
+            <a:ext cx="1414621" cy="1843934"/>
           </a:xfrm>
         </p:spPr>
         <p:txBody>
           <a:bodyPr/>
           <a:lstStyle>
             <a:lvl1pPr>
-              <a:defRPr sz="2400"/>
+              <a:defRPr sz="1100"/>
             </a:lvl1pPr>
             <a:lvl2pPr>
-              <a:defRPr sz="2000"/>
+              <a:defRPr sz="900"/>
             </a:lvl2pPr>
             <a:lvl3pPr>
-              <a:defRPr sz="1800"/>
+              <a:defRPr sz="800"/>
             </a:lvl3pPr>
             <a:lvl4pPr>
-              <a:defRPr sz="1600"/>
+              <a:defRPr sz="700"/>
             </a:lvl4pPr>
             <a:lvl5pPr>
-              <a:defRPr sz="1600"/>
+              <a:defRPr sz="700"/>
             </a:lvl5pPr>
             <a:lvl6pPr>
-              <a:defRPr sz="1600"/>
+              <a:defRPr sz="700"/>
             </a:lvl6pPr>
             <a:lvl7pPr>
-              <a:defRPr sz="1600"/>
+              <a:defRPr sz="700"/>
             </a:lvl7pPr>
             <a:lvl8pPr>
-              <a:defRPr sz="1600"/>
+              <a:defRPr sz="700"/>
             </a:lvl8pPr>
             <a:lvl9pPr>
-              <a:defRPr sz="1600"/>
+              <a:defRPr sz="700"/>
             </a:lvl9pPr>
           </a:lstStyle>
           <a:p>
@@ -2072,15 +2072,15 @@
         </p:nvSpPr>
         <p:spPr>
           <a:xfrm>
-            <a:off x="342900" y="273050"/>
-            <a:ext cx="2256235" cy="1162050"/>
+            <a:off x="160020" y="127423"/>
+            <a:ext cx="1052910" cy="542290"/>
           </a:xfrm>
         </p:spPr>
         <p:txBody>
           <a:bodyPr anchor="b"/>
           <a:lstStyle>
             <a:lvl1pPr algn="l">
-              <a:defRPr sz="2000" b="1"/>
+              <a:defRPr sz="900" b="1"/>
             </a:lvl1pPr>
           </a:lstStyle>
           <a:p>
@@ -2104,39 +2104,39 @@
         </p:nvSpPr>
         <p:spPr>
           <a:xfrm>
-            <a:off x="2681287" y="273051"/>
-            <a:ext cx="3833813" cy="5853113"/>
+            <a:off x="1251267" y="127424"/>
+            <a:ext cx="1789113" cy="2731453"/>
           </a:xfrm>
         </p:spPr>
         <p:txBody>
           <a:bodyPr/>
           <a:lstStyle>
             <a:lvl1pPr>
-              <a:defRPr sz="3200"/>
+              <a:defRPr sz="1500"/>
             </a:lvl1pPr>
             <a:lvl2pPr>
-              <a:defRPr sz="2800"/>
+              <a:defRPr sz="1300"/>
             </a:lvl2pPr>
             <a:lvl3pPr>
-              <a:defRPr sz="2400"/>
+              <a:defRPr sz="1100"/>
             </a:lvl3pPr>
             <a:lvl4pPr>
-              <a:defRPr sz="2000"/>
+              <a:defRPr sz="900"/>
             </a:lvl4pPr>
             <a:lvl5pPr>
-              <a:defRPr sz="2000"/>
+              <a:defRPr sz="900"/>
             </a:lvl5pPr>
             <a:lvl6pPr>
-              <a:defRPr sz="2000"/>
+              <a:defRPr sz="900"/>
             </a:lvl6pPr>
             <a:lvl7pPr>
-              <a:defRPr sz="2000"/>
+              <a:defRPr sz="900"/>
             </a:lvl7pPr>
             <a:lvl8pPr>
-              <a:defRPr sz="2000"/>
+              <a:defRPr sz="900"/>
             </a:lvl8pPr>
             <a:lvl9pPr>
-              <a:defRPr sz="2000"/>
+              <a:defRPr sz="900"/>
             </a:lvl9pPr>
           </a:lstStyle>
           <a:p>
@@ -2189,8 +2189,8 @@
         </p:nvSpPr>
         <p:spPr>
           <a:xfrm>
-            <a:off x="342900" y="1435101"/>
-            <a:ext cx="2256235" cy="4691063"/>
+            <a:off x="160020" y="669714"/>
+            <a:ext cx="1052910" cy="2189163"/>
           </a:xfrm>
         </p:spPr>
         <p:txBody>
@@ -2198,39 +2198,39 @@
           <a:lstStyle>
             <a:lvl1pPr marL="0" indent="0">
               <a:buNone/>
-              <a:defRPr sz="1400"/>
+              <a:defRPr sz="700"/>
             </a:lvl1pPr>
-            <a:lvl2pPr marL="457200" indent="0">
-              <a:buNone/>
-              <a:defRPr sz="1200"/>
+            <a:lvl2pPr marL="213330" indent="0">
+              <a:buNone/>
+              <a:defRPr sz="600"/>
             </a:lvl2pPr>
-            <a:lvl3pPr marL="914400" indent="0">
-              <a:buNone/>
-              <a:defRPr sz="1000"/>
+            <a:lvl3pPr marL="426659" indent="0">
+              <a:buNone/>
+              <a:defRPr sz="500"/>
             </a:lvl3pPr>
-            <a:lvl4pPr marL="1371600" indent="0">
-              <a:buNone/>
-              <a:defRPr sz="900"/>
+            <a:lvl4pPr marL="639989" indent="0">
+              <a:buNone/>
+              <a:defRPr sz="400"/>
             </a:lvl4pPr>
-            <a:lvl5pPr marL="1828800" indent="0">
-              <a:buNone/>
-              <a:defRPr sz="900"/>
+            <a:lvl5pPr marL="853318" indent="0">
+              <a:buNone/>
+              <a:defRPr sz="400"/>
             </a:lvl5pPr>
-            <a:lvl6pPr marL="2286000" indent="0">
-              <a:buNone/>
-              <a:defRPr sz="900"/>
+            <a:lvl6pPr marL="1066648" indent="0">
+              <a:buNone/>
+              <a:defRPr sz="400"/>
             </a:lvl6pPr>
-            <a:lvl7pPr marL="2743200" indent="0">
-              <a:buNone/>
-              <a:defRPr sz="900"/>
+            <a:lvl7pPr marL="1279977" indent="0">
+              <a:buNone/>
+              <a:defRPr sz="400"/>
             </a:lvl7pPr>
-            <a:lvl8pPr marL="3200400" indent="0">
-              <a:buNone/>
-              <a:defRPr sz="900"/>
+            <a:lvl8pPr marL="1493307" indent="0">
+              <a:buNone/>
+              <a:defRPr sz="400"/>
             </a:lvl8pPr>
-            <a:lvl9pPr marL="3657600" indent="0">
-              <a:buNone/>
-              <a:defRPr sz="900"/>
+            <a:lvl9pPr marL="1706636" indent="0">
+              <a:buNone/>
+              <a:defRPr sz="400"/>
             </a:lvl9pPr>
           </a:lstStyle>
           <a:p>
@@ -2349,15 +2349,15 @@
         </p:nvSpPr>
         <p:spPr>
           <a:xfrm>
-            <a:off x="1344216" y="4800600"/>
-            <a:ext cx="4114800" cy="566738"/>
+            <a:off x="627301" y="2240280"/>
+            <a:ext cx="1920240" cy="264478"/>
           </a:xfrm>
         </p:spPr>
         <p:txBody>
           <a:bodyPr anchor="b"/>
           <a:lstStyle>
             <a:lvl1pPr algn="l">
-              <a:defRPr sz="2000" b="1"/>
+              <a:defRPr sz="900" b="1"/>
             </a:lvl1pPr>
           </a:lstStyle>
           <a:p>
@@ -2381,8 +2381,8 @@
         </p:nvSpPr>
         <p:spPr>
           <a:xfrm>
-            <a:off x="1344216" y="612775"/>
-            <a:ext cx="4114800" cy="4114800"/>
+            <a:off x="627301" y="285962"/>
+            <a:ext cx="1920240" cy="1920240"/>
           </a:xfrm>
         </p:spPr>
         <p:txBody>
@@ -2390,39 +2390,39 @@
           <a:lstStyle>
             <a:lvl1pPr marL="0" indent="0">
               <a:buNone/>
-              <a:defRPr sz="3200"/>
+              <a:defRPr sz="1500"/>
             </a:lvl1pPr>
-            <a:lvl2pPr marL="457200" indent="0">
-              <a:buNone/>
-              <a:defRPr sz="2800"/>
+            <a:lvl2pPr marL="213330" indent="0">
+              <a:buNone/>
+              <a:defRPr sz="1300"/>
             </a:lvl2pPr>
-            <a:lvl3pPr marL="914400" indent="0">
-              <a:buNone/>
-              <a:defRPr sz="2400"/>
+            <a:lvl3pPr marL="426659" indent="0">
+              <a:buNone/>
+              <a:defRPr sz="1100"/>
             </a:lvl3pPr>
-            <a:lvl4pPr marL="1371600" indent="0">
-              <a:buNone/>
-              <a:defRPr sz="2000"/>
+            <a:lvl4pPr marL="639989" indent="0">
+              <a:buNone/>
+              <a:defRPr sz="900"/>
             </a:lvl4pPr>
-            <a:lvl5pPr marL="1828800" indent="0">
-              <a:buNone/>
-              <a:defRPr sz="2000"/>
+            <a:lvl5pPr marL="853318" indent="0">
+              <a:buNone/>
+              <a:defRPr sz="900"/>
             </a:lvl5pPr>
-            <a:lvl6pPr marL="2286000" indent="0">
-              <a:buNone/>
-              <a:defRPr sz="2000"/>
+            <a:lvl6pPr marL="1066648" indent="0">
+              <a:buNone/>
+              <a:defRPr sz="900"/>
             </a:lvl6pPr>
-            <a:lvl7pPr marL="2743200" indent="0">
-              <a:buNone/>
-              <a:defRPr sz="2000"/>
+            <a:lvl7pPr marL="1279977" indent="0">
+              <a:buNone/>
+              <a:defRPr sz="900"/>
             </a:lvl7pPr>
-            <a:lvl8pPr marL="3200400" indent="0">
-              <a:buNone/>
-              <a:defRPr sz="2000"/>
+            <a:lvl8pPr marL="1493307" indent="0">
+              <a:buNone/>
+              <a:defRPr sz="900"/>
             </a:lvl8pPr>
-            <a:lvl9pPr marL="3657600" indent="0">
-              <a:buNone/>
-              <a:defRPr sz="2000"/>
+            <a:lvl9pPr marL="1706636" indent="0">
+              <a:buNone/>
+              <a:defRPr sz="900"/>
             </a:lvl9pPr>
           </a:lstStyle>
           <a:p>
@@ -2442,8 +2442,8 @@
         </p:nvSpPr>
         <p:spPr>
           <a:xfrm>
-            <a:off x="1344216" y="5367338"/>
-            <a:ext cx="4114800" cy="804862"/>
+            <a:off x="627301" y="2504758"/>
+            <a:ext cx="1920240" cy="375602"/>
           </a:xfrm>
         </p:spPr>
         <p:txBody>
@@ -2451,39 +2451,39 @@
           <a:lstStyle>
             <a:lvl1pPr marL="0" indent="0">
               <a:buNone/>
-              <a:defRPr sz="1400"/>
+              <a:defRPr sz="700"/>
             </a:lvl1pPr>
-            <a:lvl2pPr marL="457200" indent="0">
-              <a:buNone/>
-              <a:defRPr sz="1200"/>
+            <a:lvl2pPr marL="213330" indent="0">
+              <a:buNone/>
+              <a:defRPr sz="600"/>
             </a:lvl2pPr>
-            <a:lvl3pPr marL="914400" indent="0">
-              <a:buNone/>
-              <a:defRPr sz="1000"/>
+            <a:lvl3pPr marL="426659" indent="0">
+              <a:buNone/>
+              <a:defRPr sz="500"/>
             </a:lvl3pPr>
-            <a:lvl4pPr marL="1371600" indent="0">
-              <a:buNone/>
-              <a:defRPr sz="900"/>
+            <a:lvl4pPr marL="639989" indent="0">
+              <a:buNone/>
+              <a:defRPr sz="400"/>
             </a:lvl4pPr>
-            <a:lvl5pPr marL="1828800" indent="0">
-              <a:buNone/>
-              <a:defRPr sz="900"/>
+            <a:lvl5pPr marL="853318" indent="0">
+              <a:buNone/>
+              <a:defRPr sz="400"/>
             </a:lvl5pPr>
-            <a:lvl6pPr marL="2286000" indent="0">
-              <a:buNone/>
-              <a:defRPr sz="900"/>
+            <a:lvl6pPr marL="1066648" indent="0">
+              <a:buNone/>
+              <a:defRPr sz="400"/>
             </a:lvl6pPr>
-            <a:lvl7pPr marL="2743200" indent="0">
-              <a:buNone/>
-              <a:defRPr sz="900"/>
+            <a:lvl7pPr marL="1279977" indent="0">
+              <a:buNone/>
+              <a:defRPr sz="400"/>
             </a:lvl7pPr>
-            <a:lvl8pPr marL="3200400" indent="0">
-              <a:buNone/>
-              <a:defRPr sz="900"/>
+            <a:lvl8pPr marL="1493307" indent="0">
+              <a:buNone/>
+              <a:defRPr sz="400"/>
             </a:lvl8pPr>
-            <a:lvl9pPr marL="3657600" indent="0">
-              <a:buNone/>
-              <a:defRPr sz="900"/>
+            <a:lvl9pPr marL="1706636" indent="0">
+              <a:buNone/>
+              <a:defRPr sz="400"/>
             </a:lvl9pPr>
           </a:lstStyle>
           <a:p>
@@ -2607,15 +2607,15 @@
         </p:nvSpPr>
         <p:spPr>
           <a:xfrm>
-            <a:off x="342900" y="274638"/>
-            <a:ext cx="6172200" cy="1143000"/>
+            <a:off x="160020" y="128164"/>
+            <a:ext cx="2880360" cy="533400"/>
           </a:xfrm>
           <a:prstGeom prst="rect">
             <a:avLst/>
           </a:prstGeom>
         </p:spPr>
         <p:txBody>
-          <a:bodyPr vert="horz" lIns="91440" tIns="45720" rIns="91440" bIns="45720" rtlCol="0" anchor="ctr">
+          <a:bodyPr vert="horz" lIns="42666" tIns="21333" rIns="42666" bIns="21333" rtlCol="0" anchor="ctr">
             <a:normAutofit/>
           </a:bodyPr>
           <a:lstStyle/>
@@ -2640,15 +2640,15 @@
         </p:nvSpPr>
         <p:spPr>
           <a:xfrm>
-            <a:off x="342900" y="1600201"/>
-            <a:ext cx="6172200" cy="4525963"/>
+            <a:off x="160020" y="746761"/>
+            <a:ext cx="2880360" cy="2112116"/>
           </a:xfrm>
           <a:prstGeom prst="rect">
             <a:avLst/>
           </a:prstGeom>
         </p:spPr>
         <p:txBody>
-          <a:bodyPr vert="horz" lIns="91440" tIns="45720" rIns="91440" bIns="45720" rtlCol="0">
+          <a:bodyPr vert="horz" lIns="42666" tIns="21333" rIns="42666" bIns="21333" rtlCol="0">
             <a:normAutofit/>
           </a:bodyPr>
           <a:lstStyle/>
@@ -2702,18 +2702,18 @@
         </p:nvSpPr>
         <p:spPr>
           <a:xfrm>
-            <a:off x="342900" y="6356351"/>
-            <a:ext cx="1600200" cy="365125"/>
+            <a:off x="160020" y="2966297"/>
+            <a:ext cx="746760" cy="170392"/>
           </a:xfrm>
           <a:prstGeom prst="rect">
             <a:avLst/>
           </a:prstGeom>
         </p:spPr>
         <p:txBody>
-          <a:bodyPr vert="horz" lIns="91440" tIns="45720" rIns="91440" bIns="45720" rtlCol="0" anchor="ctr"/>
+          <a:bodyPr vert="horz" lIns="42666" tIns="21333" rIns="42666" bIns="21333" rtlCol="0" anchor="ctr"/>
           <a:lstStyle>
             <a:lvl1pPr algn="l">
-              <a:defRPr sz="1200">
+              <a:defRPr sz="600">
                 <a:solidFill>
                   <a:schemeClr val="tx1">
                     <a:tint val="75000"/>
@@ -2743,18 +2743,18 @@
         </p:nvSpPr>
         <p:spPr>
           <a:xfrm>
-            <a:off x="2343150" y="6356351"/>
-            <a:ext cx="2171700" cy="365125"/>
+            <a:off x="1093470" y="2966297"/>
+            <a:ext cx="1013460" cy="170392"/>
           </a:xfrm>
           <a:prstGeom prst="rect">
             <a:avLst/>
           </a:prstGeom>
         </p:spPr>
         <p:txBody>
-          <a:bodyPr vert="horz" lIns="91440" tIns="45720" rIns="91440" bIns="45720" rtlCol="0" anchor="ctr"/>
+          <a:bodyPr vert="horz" lIns="42666" tIns="21333" rIns="42666" bIns="21333" rtlCol="0" anchor="ctr"/>
           <a:lstStyle>
             <a:lvl1pPr algn="ctr">
-              <a:defRPr sz="1200">
+              <a:defRPr sz="600">
                 <a:solidFill>
                   <a:schemeClr val="tx1">
                     <a:tint val="75000"/>
@@ -2780,18 +2780,18 @@
         </p:nvSpPr>
         <p:spPr>
           <a:xfrm>
-            <a:off x="4914900" y="6356351"/>
-            <a:ext cx="1600200" cy="365125"/>
+            <a:off x="2293620" y="2966297"/>
+            <a:ext cx="746760" cy="170392"/>
           </a:xfrm>
           <a:prstGeom prst="rect">
             <a:avLst/>
           </a:prstGeom>
         </p:spPr>
         <p:txBody>
-          <a:bodyPr vert="horz" lIns="91440" tIns="45720" rIns="91440" bIns="45720" rtlCol="0" anchor="ctr"/>
+          <a:bodyPr vert="horz" lIns="42666" tIns="21333" rIns="42666" bIns="21333" rtlCol="0" anchor="ctr"/>
           <a:lstStyle>
             <a:lvl1pPr algn="r">
-              <a:defRPr sz="1200">
+              <a:defRPr sz="600">
                 <a:solidFill>
                   <a:schemeClr val="tx1">
                     <a:tint val="75000"/>
@@ -2832,12 +2832,12 @@
   </p:sldLayoutIdLst>
   <p:txStyles>
     <p:titleStyle>
-      <a:lvl1pPr algn="ctr" defTabSz="457200" rtl="0" eaLnBrk="1" latinLnBrk="0" hangingPunct="1">
+      <a:lvl1pPr algn="ctr" defTabSz="213330" rtl="0" eaLnBrk="1" latinLnBrk="0" hangingPunct="1">
         <a:spcBef>
           <a:spcPct val="0"/>
         </a:spcBef>
         <a:buNone/>
-        <a:defRPr sz="4400" kern="1200">
+        <a:defRPr sz="2100" kern="1200">
           <a:solidFill>
             <a:schemeClr val="tx1"/>
           </a:solidFill>
@@ -2848,13 +2848,13 @@
       </a:lvl1pPr>
     </p:titleStyle>
     <p:bodyStyle>
-      <a:lvl1pPr marL="342900" indent="-342900" algn="l" defTabSz="457200" rtl="0" eaLnBrk="1" latinLnBrk="0" hangingPunct="1">
+      <a:lvl1pPr marL="159997" indent="-159997" algn="l" defTabSz="213330" rtl="0" eaLnBrk="1" latinLnBrk="0" hangingPunct="1">
         <a:spcBef>
           <a:spcPct val="20000"/>
         </a:spcBef>
         <a:buFont typeface="Arial"/>
         <a:buChar char="•"/>
-        <a:defRPr sz="3200" kern="1200">
+        <a:defRPr sz="1500" kern="1200">
           <a:solidFill>
             <a:schemeClr val="tx1"/>
           </a:solidFill>
@@ -2863,13 +2863,13 @@
           <a:cs typeface="+mn-cs"/>
         </a:defRPr>
       </a:lvl1pPr>
-      <a:lvl2pPr marL="742950" indent="-285750" algn="l" defTabSz="457200" rtl="0" eaLnBrk="1" latinLnBrk="0" hangingPunct="1">
+      <a:lvl2pPr marL="346660" indent="-133331" algn="l" defTabSz="213330" rtl="0" eaLnBrk="1" latinLnBrk="0" hangingPunct="1">
         <a:spcBef>
           <a:spcPct val="20000"/>
         </a:spcBef>
         <a:buFont typeface="Arial"/>
         <a:buChar char="–"/>
-        <a:defRPr sz="2800" kern="1200">
+        <a:defRPr sz="1300" kern="1200">
           <a:solidFill>
             <a:schemeClr val="tx1"/>
           </a:solidFill>
@@ -2878,13 +2878,13 @@
           <a:cs typeface="+mn-cs"/>
         </a:defRPr>
       </a:lvl2pPr>
-      <a:lvl3pPr marL="1143000" indent="-228600" algn="l" defTabSz="457200" rtl="0" eaLnBrk="1" latinLnBrk="0" hangingPunct="1">
+      <a:lvl3pPr marL="533324" indent="-106665" algn="l" defTabSz="213330" rtl="0" eaLnBrk="1" latinLnBrk="0" hangingPunct="1">
         <a:spcBef>
           <a:spcPct val="20000"/>
         </a:spcBef>
         <a:buFont typeface="Arial"/>
         <a:buChar char="•"/>
-        <a:defRPr sz="2400" kern="1200">
+        <a:defRPr sz="1100" kern="1200">
           <a:solidFill>
             <a:schemeClr val="tx1"/>
           </a:solidFill>
@@ -2893,13 +2893,13 @@
           <a:cs typeface="+mn-cs"/>
         </a:defRPr>
       </a:lvl3pPr>
-      <a:lvl4pPr marL="1600200" indent="-228600" algn="l" defTabSz="457200" rtl="0" eaLnBrk="1" latinLnBrk="0" hangingPunct="1">
+      <a:lvl4pPr marL="746653" indent="-106665" algn="l" defTabSz="213330" rtl="0" eaLnBrk="1" latinLnBrk="0" hangingPunct="1">
         <a:spcBef>
           <a:spcPct val="20000"/>
         </a:spcBef>
         <a:buFont typeface="Arial"/>
         <a:buChar char="–"/>
-        <a:defRPr sz="2000" kern="1200">
+        <a:defRPr sz="900" kern="1200">
           <a:solidFill>
             <a:schemeClr val="tx1"/>
           </a:solidFill>
@@ -2908,13 +2908,13 @@
           <a:cs typeface="+mn-cs"/>
         </a:defRPr>
       </a:lvl4pPr>
-      <a:lvl5pPr marL="2057400" indent="-228600" algn="l" defTabSz="457200" rtl="0" eaLnBrk="1" latinLnBrk="0" hangingPunct="1">
+      <a:lvl5pPr marL="959983" indent="-106665" algn="l" defTabSz="213330" rtl="0" eaLnBrk="1" latinLnBrk="0" hangingPunct="1">
         <a:spcBef>
           <a:spcPct val="20000"/>
         </a:spcBef>
         <a:buFont typeface="Arial"/>
         <a:buChar char="»"/>
-        <a:defRPr sz="2000" kern="1200">
+        <a:defRPr sz="900" kern="1200">
           <a:solidFill>
             <a:schemeClr val="tx1"/>
           </a:solidFill>
@@ -2923,13 +2923,13 @@
           <a:cs typeface="+mn-cs"/>
         </a:defRPr>
       </a:lvl5pPr>
-      <a:lvl6pPr marL="2514600" indent="-228600" algn="l" defTabSz="457200" rtl="0" eaLnBrk="1" latinLnBrk="0" hangingPunct="1">
+      <a:lvl6pPr marL="1173312" indent="-106665" algn="l" defTabSz="213330" rtl="0" eaLnBrk="1" latinLnBrk="0" hangingPunct="1">
         <a:spcBef>
           <a:spcPct val="20000"/>
         </a:spcBef>
         <a:buFont typeface="Arial"/>
         <a:buChar char="•"/>
-        <a:defRPr sz="2000" kern="1200">
+        <a:defRPr sz="900" kern="1200">
           <a:solidFill>
             <a:schemeClr val="tx1"/>
           </a:solidFill>
@@ -2938,13 +2938,13 @@
           <a:cs typeface="+mn-cs"/>
         </a:defRPr>
       </a:lvl6pPr>
-      <a:lvl7pPr marL="2971800" indent="-228600" algn="l" defTabSz="457200" rtl="0" eaLnBrk="1" latinLnBrk="0" hangingPunct="1">
+      <a:lvl7pPr marL="1386642" indent="-106665" algn="l" defTabSz="213330" rtl="0" eaLnBrk="1" latinLnBrk="0" hangingPunct="1">
         <a:spcBef>
           <a:spcPct val="20000"/>
         </a:spcBef>
         <a:buFont typeface="Arial"/>
         <a:buChar char="•"/>
-        <a:defRPr sz="2000" kern="1200">
+        <a:defRPr sz="900" kern="1200">
           <a:solidFill>
             <a:schemeClr val="tx1"/>
           </a:solidFill>
@@ -2953,13 +2953,13 @@
           <a:cs typeface="+mn-cs"/>
         </a:defRPr>
       </a:lvl7pPr>
-      <a:lvl8pPr marL="3429000" indent="-228600" algn="l" defTabSz="457200" rtl="0" eaLnBrk="1" latinLnBrk="0" hangingPunct="1">
+      <a:lvl8pPr marL="1599971" indent="-106665" algn="l" defTabSz="213330" rtl="0" eaLnBrk="1" latinLnBrk="0" hangingPunct="1">
         <a:spcBef>
           <a:spcPct val="20000"/>
         </a:spcBef>
         <a:buFont typeface="Arial"/>
         <a:buChar char="•"/>
-        <a:defRPr sz="2000" kern="1200">
+        <a:defRPr sz="900" kern="1200">
           <a:solidFill>
             <a:schemeClr val="tx1"/>
           </a:solidFill>
@@ -2968,13 +2968,13 @@
           <a:cs typeface="+mn-cs"/>
         </a:defRPr>
       </a:lvl8pPr>
-      <a:lvl9pPr marL="3886200" indent="-228600" algn="l" defTabSz="457200" rtl="0" eaLnBrk="1" latinLnBrk="0" hangingPunct="1">
+      <a:lvl9pPr marL="1813301" indent="-106665" algn="l" defTabSz="213330" rtl="0" eaLnBrk="1" latinLnBrk="0" hangingPunct="1">
         <a:spcBef>
           <a:spcPct val="20000"/>
         </a:spcBef>
         <a:buFont typeface="Arial"/>
         <a:buChar char="•"/>
-        <a:defRPr sz="2000" kern="1200">
+        <a:defRPr sz="900" kern="1200">
           <a:solidFill>
             <a:schemeClr val="tx1"/>
           </a:solidFill>
@@ -2988,8 +2988,8 @@
       <a:defPPr>
         <a:defRPr lang="en-US"/>
       </a:defPPr>
-      <a:lvl1pPr marL="0" algn="l" defTabSz="457200" rtl="0" eaLnBrk="1" latinLnBrk="0" hangingPunct="1">
-        <a:defRPr sz="1800" kern="1200">
+      <a:lvl1pPr marL="0" algn="l" defTabSz="213330" rtl="0" eaLnBrk="1" latinLnBrk="0" hangingPunct="1">
+        <a:defRPr sz="800" kern="1200">
           <a:solidFill>
             <a:schemeClr val="tx1"/>
           </a:solidFill>
@@ -2998,8 +2998,8 @@
           <a:cs typeface="+mn-cs"/>
         </a:defRPr>
       </a:lvl1pPr>
-      <a:lvl2pPr marL="457200" algn="l" defTabSz="457200" rtl="0" eaLnBrk="1" latinLnBrk="0" hangingPunct="1">
-        <a:defRPr sz="1800" kern="1200">
+      <a:lvl2pPr marL="213330" algn="l" defTabSz="213330" rtl="0" eaLnBrk="1" latinLnBrk="0" hangingPunct="1">
+        <a:defRPr sz="800" kern="1200">
           <a:solidFill>
             <a:schemeClr val="tx1"/>
           </a:solidFill>
@@ -3008,8 +3008,8 @@
           <a:cs typeface="+mn-cs"/>
         </a:defRPr>
       </a:lvl2pPr>
-      <a:lvl3pPr marL="914400" algn="l" defTabSz="457200" rtl="0" eaLnBrk="1" latinLnBrk="0" hangingPunct="1">
-        <a:defRPr sz="1800" kern="1200">
+      <a:lvl3pPr marL="426659" algn="l" defTabSz="213330" rtl="0" eaLnBrk="1" latinLnBrk="0" hangingPunct="1">
+        <a:defRPr sz="800" kern="1200">
           <a:solidFill>
             <a:schemeClr val="tx1"/>
           </a:solidFill>
@@ -3018,8 +3018,8 @@
           <a:cs typeface="+mn-cs"/>
         </a:defRPr>
       </a:lvl3pPr>
-      <a:lvl4pPr marL="1371600" algn="l" defTabSz="457200" rtl="0" eaLnBrk="1" latinLnBrk="0" hangingPunct="1">
-        <a:defRPr sz="1800" kern="1200">
+      <a:lvl4pPr marL="639989" algn="l" defTabSz="213330" rtl="0" eaLnBrk="1" latinLnBrk="0" hangingPunct="1">
+        <a:defRPr sz="800" kern="1200">
           <a:solidFill>
             <a:schemeClr val="tx1"/>
           </a:solidFill>
@@ -3028,8 +3028,8 @@
           <a:cs typeface="+mn-cs"/>
         </a:defRPr>
       </a:lvl4pPr>
-      <a:lvl5pPr marL="1828800" algn="l" defTabSz="457200" rtl="0" eaLnBrk="1" latinLnBrk="0" hangingPunct="1">
-        <a:defRPr sz="1800" kern="1200">
+      <a:lvl5pPr marL="853318" algn="l" defTabSz="213330" rtl="0" eaLnBrk="1" latinLnBrk="0" hangingPunct="1">
+        <a:defRPr sz="800" kern="1200">
           <a:solidFill>
             <a:schemeClr val="tx1"/>
           </a:solidFill>
@@ -3038,8 +3038,8 @@
           <a:cs typeface="+mn-cs"/>
         </a:defRPr>
       </a:lvl5pPr>
-      <a:lvl6pPr marL="2286000" algn="l" defTabSz="457200" rtl="0" eaLnBrk="1" latinLnBrk="0" hangingPunct="1">
-        <a:defRPr sz="1800" kern="1200">
+      <a:lvl6pPr marL="1066648" algn="l" defTabSz="213330" rtl="0" eaLnBrk="1" latinLnBrk="0" hangingPunct="1">
+        <a:defRPr sz="800" kern="1200">
           <a:solidFill>
             <a:schemeClr val="tx1"/>
           </a:solidFill>
@@ -3048,8 +3048,8 @@
           <a:cs typeface="+mn-cs"/>
         </a:defRPr>
       </a:lvl6pPr>
-      <a:lvl7pPr marL="2743200" algn="l" defTabSz="457200" rtl="0" eaLnBrk="1" latinLnBrk="0" hangingPunct="1">
-        <a:defRPr sz="1800" kern="1200">
+      <a:lvl7pPr marL="1279977" algn="l" defTabSz="213330" rtl="0" eaLnBrk="1" latinLnBrk="0" hangingPunct="1">
+        <a:defRPr sz="800" kern="1200">
           <a:solidFill>
             <a:schemeClr val="tx1"/>
           </a:solidFill>
@@ -3058,8 +3058,8 @@
           <a:cs typeface="+mn-cs"/>
         </a:defRPr>
       </a:lvl7pPr>
-      <a:lvl8pPr marL="3200400" algn="l" defTabSz="457200" rtl="0" eaLnBrk="1" latinLnBrk="0" hangingPunct="1">
-        <a:defRPr sz="1800" kern="1200">
+      <a:lvl8pPr marL="1493307" algn="l" defTabSz="213330" rtl="0" eaLnBrk="1" latinLnBrk="0" hangingPunct="1">
+        <a:defRPr sz="800" kern="1200">
           <a:solidFill>
             <a:schemeClr val="tx1"/>
           </a:solidFill>
@@ -3068,8 +3068,8 @@
           <a:cs typeface="+mn-cs"/>
         </a:defRPr>
       </a:lvl8pPr>
-      <a:lvl9pPr marL="3657600" algn="l" defTabSz="457200" rtl="0" eaLnBrk="1" latinLnBrk="0" hangingPunct="1">
-        <a:defRPr sz="1800" kern="1200">
+      <a:lvl9pPr marL="1706636" algn="l" defTabSz="213330" rtl="0" eaLnBrk="1" latinLnBrk="0" hangingPunct="1">
+        <a:defRPr sz="800" kern="1200">
           <a:solidFill>
             <a:schemeClr val="tx1"/>
           </a:solidFill>
@@ -3160,8 +3160,8 @@
         </p:blipFill>
         <p:spPr>
           <a:xfrm>
-            <a:off x="57732" y="0"/>
-            <a:ext cx="6756579" cy="6858000"/>
+            <a:off x="26942" y="0"/>
+            <a:ext cx="3153070" cy="3200400"/>
           </a:xfrm>
           <a:prstGeom prst="rect">
             <a:avLst/>
@@ -3178,8 +3178,8 @@
         </p:nvCxnSpPr>
         <p:spPr>
           <a:xfrm flipH="1">
-            <a:off x="2520935" y="2053266"/>
-            <a:ext cx="2666" cy="486912"/>
+            <a:off x="1176436" y="958191"/>
+            <a:ext cx="1244" cy="227226"/>
           </a:xfrm>
           <a:prstGeom prst="straightConnector1">
             <a:avLst/>
@@ -3214,8 +3214,8 @@
         </p:nvSpPr>
         <p:spPr>
           <a:xfrm>
-            <a:off x="1028700" y="1222269"/>
-            <a:ext cx="2989802" cy="830997"/>
+            <a:off x="480060" y="570392"/>
+            <a:ext cx="1395241" cy="387799"/>
           </a:xfrm>
           <a:prstGeom prst="rect">
             <a:avLst/>
@@ -3223,47 +3223,47 @@
           <a:noFill/>
         </p:spPr>
         <p:txBody>
-          <a:bodyPr wrap="square" rtlCol="0">
+          <a:bodyPr wrap="square" lIns="42666" tIns="21333" rIns="42666" bIns="21333" rtlCol="0">
             <a:spAutoFit/>
           </a:bodyPr>
           <a:lstStyle/>
           <a:p>
             <a:r>
-              <a:rPr lang="en-US" sz="2400" dirty="0" smtClean="0">
+              <a:rPr lang="en-US" sz="1100" dirty="0">
                 <a:latin typeface="Arial"/>
                 <a:cs typeface="Arial"/>
               </a:rPr>
               <a:t>Starting position: </a:t>
             </a:r>
             <a:r>
-              <a:rPr lang="en-US" sz="2400" dirty="0">
+              <a:rPr lang="en-US" sz="1100" dirty="0">
                 <a:latin typeface="Arial"/>
                 <a:cs typeface="Arial"/>
               </a:rPr>
               <a:t>p</a:t>
             </a:r>
             <a:r>
-              <a:rPr lang="en-US" sz="2400" dirty="0" smtClean="0">
+              <a:rPr lang="en-US" sz="1100" dirty="0">
                 <a:latin typeface="Arial"/>
                 <a:cs typeface="Arial"/>
               </a:rPr>
               <a:t>ink </a:t>
             </a:r>
             <a:r>
-              <a:rPr lang="en-US" sz="2400" dirty="0">
+              <a:rPr lang="en-US" sz="1100" dirty="0">
                 <a:latin typeface="Arial"/>
                 <a:cs typeface="Arial"/>
               </a:rPr>
               <a:t>r</a:t>
             </a:r>
             <a:r>
-              <a:rPr lang="en-US" sz="2400" dirty="0" smtClean="0">
+              <a:rPr lang="en-US" sz="1100" dirty="0">
                 <a:latin typeface="Arial"/>
                 <a:cs typeface="Arial"/>
               </a:rPr>
               <a:t>obot</a:t>
             </a:r>
-            <a:endParaRPr lang="en-US" sz="2400" dirty="0">
+            <a:endParaRPr lang="en-US" sz="1100" dirty="0">
               <a:latin typeface="Arial"/>
               <a:cs typeface="Arial"/>
             </a:endParaRPr>
@@ -3278,8 +3278,8 @@
         </p:nvSpPr>
         <p:spPr>
           <a:xfrm>
-            <a:off x="701160" y="378349"/>
-            <a:ext cx="4114148" cy="461665"/>
+            <a:off x="327208" y="176563"/>
+            <a:ext cx="1919936" cy="215444"/>
           </a:xfrm>
           <a:prstGeom prst="rect">
             <a:avLst/>
@@ -3287,19 +3287,19 @@
           <a:noFill/>
         </p:spPr>
         <p:txBody>
-          <a:bodyPr wrap="square" rtlCol="0">
+          <a:bodyPr wrap="square" lIns="42666" tIns="21333" rIns="42666" bIns="21333" rtlCol="0">
             <a:spAutoFit/>
           </a:bodyPr>
           <a:lstStyle/>
           <a:p>
             <a:r>
-              <a:rPr lang="en-US" sz="2400" dirty="0" smtClean="0">
+              <a:rPr lang="en-US" sz="1100" dirty="0">
                 <a:latin typeface="Arial"/>
                 <a:cs typeface="Arial"/>
               </a:rPr>
               <a:t>Goal Region: pink robot</a:t>
             </a:r>
-            <a:endParaRPr lang="en-US" sz="2400" dirty="0">
+            <a:endParaRPr lang="en-US" sz="1100" dirty="0">
               <a:latin typeface="Arial"/>
               <a:cs typeface="Arial"/>
             </a:endParaRPr>
@@ -3314,8 +3314,8 @@
         </p:nvCxnSpPr>
         <p:spPr>
           <a:xfrm>
-            <a:off x="3463879" y="854528"/>
-            <a:ext cx="827483" cy="367741"/>
+            <a:off x="1616477" y="398780"/>
+            <a:ext cx="386159" cy="171612"/>
           </a:xfrm>
           <a:prstGeom prst="straightConnector1">
             <a:avLst/>
@@ -3350,8 +3350,8 @@
         </p:nvSpPr>
         <p:spPr>
           <a:xfrm>
-            <a:off x="4224345" y="3184952"/>
-            <a:ext cx="2555875" cy="830997"/>
+            <a:off x="1971361" y="1486311"/>
+            <a:ext cx="1192742" cy="387799"/>
           </a:xfrm>
           <a:prstGeom prst="rect">
             <a:avLst/>
@@ -3359,13 +3359,13 @@
           <a:noFill/>
         </p:spPr>
         <p:txBody>
-          <a:bodyPr wrap="square" rtlCol="0">
+          <a:bodyPr wrap="square" lIns="42666" tIns="21333" rIns="42666" bIns="21333" rtlCol="0">
             <a:spAutoFit/>
           </a:bodyPr>
           <a:lstStyle/>
           <a:p>
             <a:r>
-              <a:rPr lang="en-US" sz="2400" dirty="0" smtClean="0">
+              <a:rPr lang="en-US" sz="1100" dirty="0">
                 <a:latin typeface="Arial"/>
                 <a:cs typeface="Arial"/>
               </a:rPr>
@@ -3374,27 +3374,27 @@
           </a:p>
           <a:p>
             <a:r>
-              <a:rPr lang="en-US" sz="2400" dirty="0" smtClean="0">
+              <a:rPr lang="en-US" sz="1100" dirty="0">
                 <a:latin typeface="Arial"/>
                 <a:cs typeface="Arial"/>
               </a:rPr>
               <a:t>green </a:t>
             </a:r>
             <a:r>
-              <a:rPr lang="en-US" sz="2400" dirty="0">
+              <a:rPr lang="en-US" sz="1100" dirty="0">
                 <a:latin typeface="Arial"/>
                 <a:cs typeface="Arial"/>
               </a:rPr>
               <a:t>r</a:t>
             </a:r>
             <a:r>
-              <a:rPr lang="en-US" sz="2400" dirty="0" smtClean="0">
+              <a:rPr lang="en-US" sz="1100" dirty="0">
                 <a:latin typeface="Arial"/>
                 <a:cs typeface="Arial"/>
               </a:rPr>
               <a:t>obot</a:t>
             </a:r>
-            <a:endParaRPr lang="en-US" sz="2400" dirty="0">
+            <a:endParaRPr lang="en-US" sz="1100" dirty="0">
               <a:latin typeface="Arial"/>
               <a:cs typeface="Arial"/>
             </a:endParaRPr>
@@ -3409,8 +3409,8 @@
         </p:nvCxnSpPr>
         <p:spPr>
           <a:xfrm flipH="1">
-            <a:off x="4695481" y="3923616"/>
-            <a:ext cx="618628" cy="367746"/>
+            <a:off x="2191225" y="1831021"/>
+            <a:ext cx="288693" cy="171615"/>
           </a:xfrm>
           <a:prstGeom prst="straightConnector1">
             <a:avLst/>
@@ -3445,8 +3445,8 @@
         </p:nvSpPr>
         <p:spPr>
           <a:xfrm>
-            <a:off x="2758234" y="5454134"/>
-            <a:ext cx="4021986" cy="461665"/>
+            <a:off x="1287176" y="2545263"/>
+            <a:ext cx="1876927" cy="215444"/>
           </a:xfrm>
           <a:prstGeom prst="rect">
             <a:avLst/>
@@ -3454,19 +3454,19 @@
           <a:noFill/>
         </p:spPr>
         <p:txBody>
-          <a:bodyPr wrap="square" rtlCol="0">
+          <a:bodyPr wrap="square" lIns="42666" tIns="21333" rIns="42666" bIns="21333" rtlCol="0">
             <a:spAutoFit/>
           </a:bodyPr>
           <a:lstStyle/>
           <a:p>
             <a:r>
-              <a:rPr lang="en-US" sz="2400" dirty="0" smtClean="0">
+              <a:rPr lang="en-US" sz="1100" dirty="0">
                 <a:latin typeface="Arial"/>
                 <a:cs typeface="Arial"/>
               </a:rPr>
               <a:t>Goal Region: green robot</a:t>
             </a:r>
-            <a:endParaRPr lang="en-US" sz="2400" dirty="0">
+            <a:endParaRPr lang="en-US" sz="1100" dirty="0">
               <a:latin typeface="Arial"/>
               <a:cs typeface="Arial"/>
             </a:endParaRPr>
@@ -3481,8 +3481,8 @@
         </p:nvCxnSpPr>
         <p:spPr>
           <a:xfrm flipH="1" flipV="1">
-            <a:off x="3154565" y="5175026"/>
-            <a:ext cx="309314" cy="279108"/>
+            <a:off x="1472130" y="2415012"/>
+            <a:ext cx="144347" cy="130250"/>
           </a:xfrm>
           <a:prstGeom prst="straightConnector1">
             <a:avLst/>

</xml_diff>